<commit_message>
first HGF slide in intro.pptx
</commit_message>
<xml_diff>
--- a/presentation/intro.pptx
+++ b/presentation/intro.pptx
@@ -9,7 +9,8 @@
     <p:sldId id="256" r:id="rId3"/>
     <p:sldId id="257" r:id="rId4"/>
     <p:sldId id="258" r:id="rId5"/>
-    <p:sldId id="261" r:id="rId6"/>
+    <p:sldId id="262" r:id="rId6"/>
+    <p:sldId id="261" r:id="rId7"/>
   </p:sldIdLst>
   <p:sldSz cx="12192000" cy="6858000"/>
   <p:notesSz cx="6858000" cy="9144000"/>
@@ -825,6 +826,13 @@
   <p:clrMapOvr>
     <a:masterClrMapping/>
   </p:clrMapOvr>
+  <p:timing>
+    <p:tnLst>
+      <p:par>
+        <p:cTn id="1" dur="indefinite" restart="never" nodeType="tmRoot"/>
+      </p:par>
+    </p:tnLst>
+  </p:timing>
 </p:sldLayout>
 </file>
 
@@ -3545,7 +3553,29 @@
                 <a:ea typeface="CMU Bright Roman" charset="0"/>
                 <a:cs typeface="CMU Bright Roman" charset="0"/>
               </a:rPr>
-              <a:t>… could this degree potentially be used as diagnostic tool in computational psychiatry?</a:t>
+              <a:t>… could this </a:t>
+            </a:r>
+            <a:r>
+              <a:rPr lang="en-US" altLang="zh-CN" sz="3600" b="1" dirty="0" smtClean="0">
+                <a:solidFill>
+                  <a:schemeClr val="bg1"/>
+                </a:solidFill>
+                <a:latin typeface="CMU Bright Roman" charset="0"/>
+                <a:ea typeface="CMU Bright Roman" charset="0"/>
+                <a:cs typeface="CMU Bright Roman" charset="0"/>
+              </a:rPr>
+              <a:t>degree</a:t>
+            </a:r>
+            <a:r>
+              <a:rPr lang="en-US" altLang="zh-CN" sz="3600" dirty="0" smtClean="0">
+                <a:solidFill>
+                  <a:schemeClr val="bg1"/>
+                </a:solidFill>
+                <a:latin typeface="CMU Bright Roman" charset="0"/>
+                <a:ea typeface="CMU Bright Roman" charset="0"/>
+                <a:cs typeface="CMU Bright Roman" charset="0"/>
+              </a:rPr>
+              <a:t> potentially be used as diagnostic tool in computational psychiatry?</a:t>
             </a:r>
           </a:p>
           <a:p>
@@ -3823,6 +3853,477 @@
       </p:grpSpPr>
       <p:sp>
         <p:nvSpPr>
+          <p:cNvPr id="8" name="Rectangle 7"/>
+          <p:cNvSpPr/>
+          <p:nvPr/>
+        </p:nvSpPr>
+        <p:spPr>
+          <a:xfrm>
+            <a:off x="6444343" y="4038107"/>
+            <a:ext cx="4909457" cy="836833"/>
+          </a:xfrm>
+          <a:prstGeom prst="rect">
+            <a:avLst/>
+          </a:prstGeom>
+          <a:solidFill>
+            <a:schemeClr val="tx1"/>
+          </a:solidFill>
+        </p:spPr>
+        <p:style>
+          <a:lnRef idx="2">
+            <a:schemeClr val="accent1">
+              <a:shade val="50000"/>
+            </a:schemeClr>
+          </a:lnRef>
+          <a:fillRef idx="1">
+            <a:schemeClr val="accent1"/>
+          </a:fillRef>
+          <a:effectRef idx="0">
+            <a:schemeClr val="accent1"/>
+          </a:effectRef>
+          <a:fontRef idx="minor">
+            <a:schemeClr val="lt1"/>
+          </a:fontRef>
+        </p:style>
+        <p:txBody>
+          <a:bodyPr rtlCol="0" anchor="ctr"/>
+          <a:lstStyle/>
+          <a:p>
+            <a:pPr algn="ctr"/>
+            <a:endParaRPr lang="en-US"/>
+          </a:p>
+        </p:txBody>
+      </p:sp>
+      <p:sp>
+        <p:nvSpPr>
+          <p:cNvPr id="2" name="Title 1"/>
+          <p:cNvSpPr>
+            <a:spLocks noGrp="1"/>
+          </p:cNvSpPr>
+          <p:nvPr>
+            <p:ph type="title"/>
+          </p:nvPr>
+        </p:nvSpPr>
+        <p:spPr/>
+        <p:txBody>
+          <a:bodyPr/>
+          <a:lstStyle/>
+          <a:p>
+            <a:r>
+              <a:rPr lang="en-US" dirty="0" smtClean="0">
+                <a:latin typeface="CMU Sans Serif Medium" charset="0"/>
+                <a:ea typeface="CMU Sans Serif Medium" charset="0"/>
+                <a:cs typeface="CMU Sans Serif Medium" charset="0"/>
+              </a:rPr>
+              <a:t>The HGF </a:t>
+            </a:r>
+            <a:r>
+              <a:rPr lang="mr-IN" dirty="0" smtClean="0">
+                <a:latin typeface="CMU Sans Serif Medium" charset="0"/>
+                <a:ea typeface="CMU Sans Serif Medium" charset="0"/>
+                <a:cs typeface="CMU Sans Serif Medium" charset="0"/>
+              </a:rPr>
+              <a:t>–</a:t>
+            </a:r>
+            <a:r>
+              <a:rPr lang="en-US" dirty="0" smtClean="0">
+                <a:latin typeface="CMU Sans Serif Medium" charset="0"/>
+                <a:ea typeface="CMU Sans Serif Medium" charset="0"/>
+                <a:cs typeface="CMU Sans Serif Medium" charset="0"/>
+              </a:rPr>
+              <a:t> A generative model of </a:t>
+            </a:r>
+            <a:r>
+              <a:rPr lang="en-US" b="1" dirty="0" smtClean="0">
+                <a:latin typeface="CMU Sans Serif Medium" charset="0"/>
+                <a:ea typeface="CMU Sans Serif Medium" charset="0"/>
+                <a:cs typeface="CMU Sans Serif Medium" charset="0"/>
+              </a:rPr>
+              <a:t>behavior</a:t>
+            </a:r>
+            <a:endParaRPr lang="en-US" b="1" dirty="0">
+              <a:latin typeface="CMU Sans Serif Medium" charset="0"/>
+              <a:ea typeface="CMU Sans Serif Medium" charset="0"/>
+              <a:cs typeface="CMU Sans Serif Medium" charset="0"/>
+            </a:endParaRPr>
+          </a:p>
+        </p:txBody>
+      </p:sp>
+      <p:pic>
+        <p:nvPicPr>
+          <p:cNvPr id="4" name="Picture 3"/>
+          <p:cNvPicPr>
+            <a:picLocks noChangeAspect="1"/>
+          </p:cNvPicPr>
+          <p:nvPr/>
+        </p:nvPicPr>
+        <p:blipFill>
+          <a:blip r:embed="rId2">
+            <a:extLst>
+              <a:ext uri="{28A0092B-C50C-407E-A947-70E740481C1C}">
+                <a14:useLocalDpi xmlns:a14="http://schemas.microsoft.com/office/drawing/2010/main" val="0"/>
+              </a:ext>
+            </a:extLst>
+          </a:blip>
+          <a:stretch>
+            <a:fillRect/>
+          </a:stretch>
+        </p:blipFill>
+        <p:spPr>
+          <a:xfrm>
+            <a:off x="838200" y="1690688"/>
+            <a:ext cx="5322752" cy="4891177"/>
+          </a:xfrm>
+          <a:prstGeom prst="rect">
+            <a:avLst/>
+          </a:prstGeom>
+        </p:spPr>
+      </p:pic>
+      <p:sp>
+        <p:nvSpPr>
+          <p:cNvPr id="5" name="TextBox 4"/>
+          <p:cNvSpPr txBox="1"/>
+          <p:nvPr/>
+        </p:nvSpPr>
+        <p:spPr>
+          <a:xfrm>
+            <a:off x="6444343" y="2283781"/>
+            <a:ext cx="5332111" cy="1754326"/>
+          </a:xfrm>
+          <a:prstGeom prst="rect">
+            <a:avLst/>
+          </a:prstGeom>
+          <a:noFill/>
+        </p:spPr>
+        <p:txBody>
+          <a:bodyPr wrap="square" rtlCol="0">
+            <a:spAutoFit/>
+          </a:bodyPr>
+          <a:lstStyle/>
+          <a:p>
+            <a:r>
+              <a:rPr lang="en-US" dirty="0" smtClean="0">
+                <a:latin typeface="CMU Sans Serif Medium" charset="0"/>
+                <a:ea typeface="CMU Sans Serif Medium" charset="0"/>
+                <a:cs typeface="CMU Sans Serif Medium" charset="0"/>
+              </a:rPr>
+              <a:t>STIMULUS CATEGORY and TENDENCY to be read in </a:t>
+            </a:r>
+            <a:r>
+              <a:rPr lang="en-US" b="1" dirty="0" smtClean="0">
+                <a:latin typeface="CMU Sans Serif Medium" charset="0"/>
+                <a:ea typeface="CMU Sans Serif Medium" charset="0"/>
+                <a:cs typeface="CMU Sans Serif Medium" charset="0"/>
+              </a:rPr>
+              <a:t>cue-stimulus-contingency </a:t>
+            </a:r>
+            <a:r>
+              <a:rPr lang="en-US" dirty="0" smtClean="0">
+                <a:latin typeface="CMU Sans Serif Medium" charset="0"/>
+                <a:ea typeface="CMU Sans Serif Medium" charset="0"/>
+                <a:cs typeface="CMU Sans Serif Medium" charset="0"/>
+              </a:rPr>
+              <a:t>terms:</a:t>
+            </a:r>
+          </a:p>
+          <a:p>
+            <a:endParaRPr lang="en-US" dirty="0" smtClean="0">
+              <a:latin typeface="CMU Sans Serif Medium" charset="0"/>
+              <a:ea typeface="CMU Sans Serif Medium" charset="0"/>
+              <a:cs typeface="CMU Sans Serif Medium" charset="0"/>
+            </a:endParaRPr>
+          </a:p>
+          <a:p>
+            <a:r>
+              <a:rPr lang="en-US" b="1" dirty="0" smtClean="0">
+                <a:latin typeface="CMU Sans Serif Medium" charset="0"/>
+                <a:ea typeface="CMU Sans Serif Medium" charset="0"/>
+                <a:cs typeface="CMU Sans Serif Medium" charset="0"/>
+              </a:rPr>
+              <a:t>1</a:t>
+            </a:r>
+            <a:r>
+              <a:rPr lang="en-US" dirty="0" smtClean="0">
+                <a:latin typeface="CMU Sans Serif Medium" charset="0"/>
+                <a:ea typeface="CMU Sans Serif Medium" charset="0"/>
+                <a:cs typeface="CMU Sans Serif Medium" charset="0"/>
+              </a:rPr>
+              <a:t> is defined as square </a:t>
+            </a:r>
+            <a:r>
+              <a:rPr lang="en-US" dirty="0" smtClean="0">
+                <a:latin typeface="CMU Sans Serif Medium" charset="0"/>
+                <a:ea typeface="CMU Sans Serif Medium" charset="0"/>
+                <a:cs typeface="CMU Sans Serif Medium" charset="0"/>
+                <a:sym typeface="Wingdings"/>
+              </a:rPr>
+              <a:t> tone or circle  no tone</a:t>
+            </a:r>
+          </a:p>
+          <a:p>
+            <a:r>
+              <a:rPr lang="en-US" b="1" dirty="0" smtClean="0">
+                <a:latin typeface="CMU Sans Serif Medium" charset="0"/>
+                <a:ea typeface="CMU Sans Serif Medium" charset="0"/>
+                <a:cs typeface="CMU Sans Serif Medium" charset="0"/>
+              </a:rPr>
+              <a:t>0</a:t>
+            </a:r>
+            <a:r>
+              <a:rPr lang="en-US" dirty="0" smtClean="0">
+                <a:latin typeface="CMU Sans Serif Medium" charset="0"/>
+                <a:ea typeface="CMU Sans Serif Medium" charset="0"/>
+                <a:cs typeface="CMU Sans Serif Medium" charset="0"/>
+              </a:rPr>
+              <a:t> </a:t>
+            </a:r>
+            <a:r>
+              <a:rPr lang="en-US" dirty="0">
+                <a:latin typeface="CMU Sans Serif Medium" charset="0"/>
+                <a:ea typeface="CMU Sans Serif Medium" charset="0"/>
+                <a:cs typeface="CMU Sans Serif Medium" charset="0"/>
+              </a:rPr>
+              <a:t>is defined as square </a:t>
+            </a:r>
+            <a:r>
+              <a:rPr lang="en-US" dirty="0">
+                <a:latin typeface="CMU Sans Serif Medium" charset="0"/>
+                <a:ea typeface="CMU Sans Serif Medium" charset="0"/>
+                <a:cs typeface="CMU Sans Serif Medium" charset="0"/>
+                <a:sym typeface="Wingdings"/>
+              </a:rPr>
+              <a:t> </a:t>
+            </a:r>
+            <a:r>
+              <a:rPr lang="en-US" dirty="0" smtClean="0">
+                <a:latin typeface="CMU Sans Serif Medium" charset="0"/>
+                <a:ea typeface="CMU Sans Serif Medium" charset="0"/>
+                <a:cs typeface="CMU Sans Serif Medium" charset="0"/>
+                <a:sym typeface="Wingdings"/>
+              </a:rPr>
+              <a:t>no tone </a:t>
+            </a:r>
+            <a:r>
+              <a:rPr lang="en-US" dirty="0">
+                <a:latin typeface="CMU Sans Serif Medium" charset="0"/>
+                <a:ea typeface="CMU Sans Serif Medium" charset="0"/>
+                <a:cs typeface="CMU Sans Serif Medium" charset="0"/>
+                <a:sym typeface="Wingdings"/>
+              </a:rPr>
+              <a:t>or circle </a:t>
+            </a:r>
+            <a:r>
+              <a:rPr lang="en-US" dirty="0" smtClean="0">
+                <a:latin typeface="CMU Sans Serif Medium" charset="0"/>
+                <a:ea typeface="CMU Sans Serif Medium" charset="0"/>
+                <a:cs typeface="CMU Sans Serif Medium" charset="0"/>
+                <a:sym typeface="Wingdings"/>
+              </a:rPr>
+              <a:t> </a:t>
+            </a:r>
+            <a:r>
+              <a:rPr lang="en-US" dirty="0">
+                <a:latin typeface="CMU Sans Serif Medium" charset="0"/>
+                <a:ea typeface="CMU Sans Serif Medium" charset="0"/>
+                <a:cs typeface="CMU Sans Serif Medium" charset="0"/>
+                <a:sym typeface="Wingdings"/>
+              </a:rPr>
+              <a:t>tone</a:t>
+            </a:r>
+          </a:p>
+          <a:p>
+            <a:endParaRPr lang="en-US" dirty="0">
+              <a:latin typeface="CMU Sans Serif Medium" charset="0"/>
+              <a:ea typeface="CMU Sans Serif Medium" charset="0"/>
+              <a:cs typeface="CMU Sans Serif Medium" charset="0"/>
+            </a:endParaRPr>
+          </a:p>
+        </p:txBody>
+      </p:sp>
+      <p:sp>
+        <p:nvSpPr>
+          <p:cNvPr id="7" name="Rectangle 6"/>
+          <p:cNvSpPr/>
+          <p:nvPr/>
+        </p:nvSpPr>
+        <p:spPr>
+          <a:xfrm>
+            <a:off x="6444343" y="4136276"/>
+            <a:ext cx="4798423" cy="646331"/>
+          </a:xfrm>
+          <a:prstGeom prst="rect">
+            <a:avLst/>
+          </a:prstGeom>
+        </p:spPr>
+        <p:txBody>
+          <a:bodyPr wrap="square">
+            <a:spAutoFit/>
+          </a:bodyPr>
+          <a:lstStyle/>
+          <a:p>
+            <a:r>
+              <a:rPr lang="en-US" altLang="zh-CN" dirty="0">
+                <a:solidFill>
+                  <a:schemeClr val="bg1"/>
+                </a:solidFill>
+                <a:latin typeface="CMU Bright Roman" charset="0"/>
+                <a:ea typeface="CMU Bright Roman" charset="0"/>
+                <a:cs typeface="CMU Bright Roman" charset="0"/>
+              </a:rPr>
+              <a:t>To what degree do </a:t>
+            </a:r>
+            <a:r>
+              <a:rPr lang="en-US" altLang="zh-CN" b="1" dirty="0">
+                <a:solidFill>
+                  <a:schemeClr val="bg1"/>
+                </a:solidFill>
+                <a:latin typeface="CMU Bright Roman" charset="0"/>
+                <a:ea typeface="CMU Bright Roman" charset="0"/>
+                <a:cs typeface="CMU Bright Roman" charset="0"/>
+              </a:rPr>
+              <a:t>aversive</a:t>
+            </a:r>
+            <a:r>
+              <a:rPr lang="en-US" altLang="zh-CN" dirty="0">
+                <a:solidFill>
+                  <a:schemeClr val="bg1"/>
+                </a:solidFill>
+                <a:latin typeface="CMU Bright Roman" charset="0"/>
+                <a:ea typeface="CMU Bright Roman" charset="0"/>
+                <a:cs typeface="CMU Bright Roman" charset="0"/>
+              </a:rPr>
+              <a:t> vs. </a:t>
+            </a:r>
+            <a:r>
+              <a:rPr lang="en-US" altLang="zh-CN" b="1" dirty="0">
+                <a:solidFill>
+                  <a:schemeClr val="bg1"/>
+                </a:solidFill>
+                <a:latin typeface="CMU Bright Roman" charset="0"/>
+                <a:ea typeface="CMU Bright Roman" charset="0"/>
+                <a:cs typeface="CMU Bright Roman" charset="0"/>
+              </a:rPr>
+              <a:t>neutral</a:t>
+            </a:r>
+            <a:r>
+              <a:rPr lang="en-US" altLang="zh-CN" dirty="0">
+                <a:solidFill>
+                  <a:schemeClr val="bg1"/>
+                </a:solidFill>
+                <a:latin typeface="CMU Bright Roman" charset="0"/>
+                <a:ea typeface="CMU Bright Roman" charset="0"/>
+                <a:cs typeface="CMU Bright Roman" charset="0"/>
+              </a:rPr>
+              <a:t> stimuli </a:t>
+            </a:r>
+            <a:r>
+              <a:rPr lang="en-US" altLang="zh-CN" b="1" dirty="0">
+                <a:solidFill>
+                  <a:schemeClr val="bg1"/>
+                </a:solidFill>
+                <a:latin typeface="CMU Bright Roman" charset="0"/>
+                <a:ea typeface="CMU Bright Roman" charset="0"/>
+                <a:cs typeface="CMU Bright Roman" charset="0"/>
+              </a:rPr>
+              <a:t>bias behavior</a:t>
+            </a:r>
+            <a:r>
+              <a:rPr lang="en-US" altLang="zh-CN" dirty="0" smtClean="0">
+                <a:solidFill>
+                  <a:schemeClr val="bg1"/>
+                </a:solidFill>
+                <a:latin typeface="CMU Bright Roman" charset="0"/>
+                <a:ea typeface="CMU Bright Roman" charset="0"/>
+                <a:cs typeface="CMU Bright Roman" charset="0"/>
+              </a:rPr>
+              <a:t>?</a:t>
+            </a:r>
+          </a:p>
+        </p:txBody>
+      </p:sp>
+      <p:sp>
+        <p:nvSpPr>
+          <p:cNvPr id="9" name="Rectangle 8"/>
+          <p:cNvSpPr/>
+          <p:nvPr/>
+        </p:nvSpPr>
+        <p:spPr>
+          <a:xfrm>
+            <a:off x="6390079" y="4973109"/>
+            <a:ext cx="5017984" cy="923330"/>
+          </a:xfrm>
+          <a:prstGeom prst="rect">
+            <a:avLst/>
+          </a:prstGeom>
+        </p:spPr>
+        <p:txBody>
+          <a:bodyPr wrap="square">
+            <a:spAutoFit/>
+          </a:bodyPr>
+          <a:lstStyle/>
+          <a:p>
+            <a:endParaRPr lang="en-US" altLang="zh-CN" dirty="0">
+              <a:latin typeface="CMU Bright Roman" charset="0"/>
+              <a:ea typeface="CMU Bright Roman" charset="0"/>
+              <a:cs typeface="CMU Bright Roman" charset="0"/>
+            </a:endParaRPr>
+          </a:p>
+          <a:p>
+            <a:r>
+              <a:rPr lang="en-US" altLang="zh-CN" dirty="0">
+                <a:latin typeface="CMU Bright Roman" charset="0"/>
+                <a:ea typeface="CMU Bright Roman" charset="0"/>
+                <a:cs typeface="CMU Bright Roman" charset="0"/>
+              </a:rPr>
+              <a:t>Fit HGFs for both neutral and aversive blocks for all subjects and compare parameters.</a:t>
+            </a:r>
+            <a:endParaRPr lang="en-US" altLang="zh-CN" dirty="0">
+              <a:latin typeface="CMU Bright Roman" charset="0"/>
+              <a:ea typeface="CMU Bright Roman" charset="0"/>
+              <a:cs typeface="CMU Bright Roman" charset="0"/>
+            </a:endParaRPr>
+          </a:p>
+        </p:txBody>
+      </p:sp>
+    </p:spTree>
+    <p:extLst>
+      <p:ext uri="{BB962C8B-B14F-4D97-AF65-F5344CB8AC3E}">
+        <p14:creationId xmlns:p14="http://schemas.microsoft.com/office/powerpoint/2010/main" val="1791295831"/>
+      </p:ext>
+    </p:extLst>
+  </p:cSld>
+  <p:clrMapOvr>
+    <a:masterClrMapping/>
+  </p:clrMapOvr>
+  <p:timing>
+    <p:tnLst>
+      <p:par>
+        <p:cTn id="1" dur="indefinite" restart="never" nodeType="tmRoot"/>
+      </p:par>
+    </p:tnLst>
+  </p:timing>
+</p:sld>
+</file>
+
+<file path=ppt/slides/slide6.xml><?xml version="1.0" encoding="utf-8"?>
+<p:sld xmlns:a="http://schemas.openxmlformats.org/drawingml/2006/main" xmlns:r="http://schemas.openxmlformats.org/officeDocument/2006/relationships" xmlns:p="http://schemas.openxmlformats.org/presentationml/2006/main">
+  <p:cSld>
+    <p:spTree>
+      <p:nvGrpSpPr>
+        <p:cNvPr id="1" name=""/>
+        <p:cNvGrpSpPr/>
+        <p:nvPr/>
+      </p:nvGrpSpPr>
+      <p:grpSpPr>
+        <a:xfrm>
+          <a:off x="0" y="0"/>
+          <a:ext cx="0" cy="0"/>
+          <a:chOff x="0" y="0"/>
+          <a:chExt cx="0" cy="0"/>
+        </a:xfrm>
+      </p:grpSpPr>
+      <p:sp>
+        <p:nvSpPr>
           <p:cNvPr id="2" name="Title 1"/>
           <p:cNvSpPr>
             <a:spLocks noGrp="1"/>
@@ -3947,22 +4448,22 @@
         <a:srgbClr val="954F72"/>
       </a:folHlink>
     </a:clrScheme>
-    <a:fontScheme name="Office">
+    <a:fontScheme name="Corbel">
       <a:majorFont>
-        <a:latin typeface="Calibri Light" panose="020F0302020204030204"/>
+        <a:latin typeface="Corbel" panose="020B0503020204020204"/>
         <a:ea typeface=""/>
         <a:cs typeface=""/>
-        <a:font script="Jpan" typeface="Yu Gothic Light"/>
-        <a:font script="Hang" typeface="맑은 고딕"/>
-        <a:font script="Hans" typeface="DengXian Light"/>
+        <a:font script="Jpan" typeface="HGｺﾞｼｯｸM"/>
+        <a:font script="Hang" typeface="HY엽서L"/>
+        <a:font script="Hans" typeface="华文楷体"/>
         <a:font script="Hant" typeface="新細明體"/>
-        <a:font script="Arab" typeface="Times New Roman"/>
-        <a:font script="Hebr" typeface="Times New Roman"/>
-        <a:font script="Thai" typeface="Angsana New"/>
+        <a:font script="Arab" typeface="Tahoma"/>
+        <a:font script="Hebr" typeface="Miriam"/>
+        <a:font script="Thai" typeface="DilleniaUPC"/>
         <a:font script="Ethi" typeface="Nyala"/>
         <a:font script="Beng" typeface="Vrinda"/>
         <a:font script="Gujr" typeface="Shruti"/>
-        <a:font script="Khmr" typeface="MoolBoran"/>
+        <a:font script="Khmr" typeface="DaunPenh"/>
         <a:font script="Knda" typeface="Tunga"/>
         <a:font script="Guru" typeface="Raavi"/>
         <a:font script="Cans" typeface="Euphemia"/>
@@ -3979,21 +4480,21 @@
         <a:font script="Laoo" typeface="DokChampa"/>
         <a:font script="Sinh" typeface="Iskoola Pota"/>
         <a:font script="Mong" typeface="Mongolian Baiti"/>
-        <a:font script="Viet" typeface="Times New Roman"/>
+        <a:font script="Viet" typeface="Arial"/>
         <a:font script="Uigh" typeface="Microsoft Uighur"/>
         <a:font script="Geor" typeface="Sylfaen"/>
       </a:majorFont>
       <a:minorFont>
-        <a:latin typeface="Calibri" panose="020F0502020204030204"/>
+        <a:latin typeface="Corbel" panose="020B0503020204020204"/>
         <a:ea typeface=""/>
         <a:cs typeface=""/>
-        <a:font script="Jpan" typeface="Yu Gothic"/>
-        <a:font script="Hang" typeface="맑은 고딕"/>
-        <a:font script="Hans" typeface="DengXian"/>
+        <a:font script="Jpan" typeface="HGｺﾞｼｯｸM"/>
+        <a:font script="Hang" typeface="HY엽서L"/>
+        <a:font script="Hans" typeface="华文楷体"/>
         <a:font script="Hant" typeface="新細明體"/>
-        <a:font script="Arab" typeface="Arial"/>
-        <a:font script="Hebr" typeface="Arial"/>
-        <a:font script="Thai" typeface="Cordia New"/>
+        <a:font script="Arab" typeface="Tahoma"/>
+        <a:font script="Hebr" typeface="Miriam"/>
+        <a:font script="Thai" typeface="DilleniaUPC"/>
         <a:font script="Ethi" typeface="Nyala"/>
         <a:font script="Beng" typeface="Vrinda"/>
         <a:font script="Gujr" typeface="Shruti"/>

</xml_diff>